<commit_message>
Updated script and pptx
</commit_message>
<xml_diff>
--- a/GoPresentation.pptx
+++ b/GoPresentation.pptx
@@ -825,7 +825,7 @@
           <a:p>
             <a:fld id="{ED291B17-9318-49DB-B28B-6E5994AE9581}" type="datetime1">
               <a:rPr lang="en-US" smtClean="0"/>
-              <a:t>04/24/21</a:t>
+              <a:t>04/29/21</a:t>
             </a:fld>
             <a:endParaRPr lang="en-US" dirty="0"/>
           </a:p>
@@ -1028,7 +1028,7 @@
           <a:p>
             <a:fld id="{2CED4963-E985-44C4-B8C4-FDD613B7C2F8}" type="datetime1">
               <a:rPr lang="en-US" smtClean="0"/>
-              <a:t>04/24/21</a:t>
+              <a:t>04/29/21</a:t>
             </a:fld>
             <a:endParaRPr lang="en-US" dirty="0"/>
           </a:p>
@@ -1390,7 +1390,7 @@
           <a:p>
             <a:fld id="{ED291B17-9318-49DB-B28B-6E5994AE9581}" type="datetime1">
               <a:rPr lang="en-US" smtClean="0"/>
-              <a:t>04/24/21</a:t>
+              <a:t>04/29/21</a:t>
             </a:fld>
             <a:endParaRPr lang="en-US" dirty="0"/>
           </a:p>
@@ -1588,7 +1588,7 @@
           <a:p>
             <a:fld id="{78DD82B9-B8EE-4375-B6FF-88FA6ABB15D9}" type="datetime1">
               <a:rPr lang="en-US" smtClean="0"/>
-              <a:t>04/24/21</a:t>
+              <a:t>04/29/21</a:t>
             </a:fld>
             <a:endParaRPr lang="en-US" dirty="0"/>
           </a:p>
@@ -1900,7 +1900,7 @@
           <a:p>
             <a:fld id="{B2497495-0637-405E-AE64-5CC7506D51F5}" type="datetime1">
               <a:rPr lang="en-US" smtClean="0"/>
-              <a:t>04/24/21</a:t>
+              <a:t>04/29/21</a:t>
             </a:fld>
             <a:endParaRPr lang="en-US" dirty="0"/>
           </a:p>
@@ -2153,7 +2153,7 @@
           <a:p>
             <a:fld id="{7BFFD690-9426-415D-8B65-26881E07B2D4}" type="datetime1">
               <a:rPr lang="en-US" smtClean="0"/>
-              <a:t>04/24/21</a:t>
+              <a:t>04/29/21</a:t>
             </a:fld>
             <a:endParaRPr lang="en-US" dirty="0"/>
           </a:p>
@@ -2575,7 +2575,7 @@
           <a:p>
             <a:fld id="{04C4989A-474C-40DE-95B9-011C28B71673}" type="datetime1">
               <a:rPr lang="en-US" smtClean="0"/>
-              <a:t>04/24/21</a:t>
+              <a:t>04/29/21</a:t>
             </a:fld>
             <a:endParaRPr lang="en-US" dirty="0"/>
           </a:p>
@@ -2698,7 +2698,7 @@
           <a:p>
             <a:fld id="{5DB4ED54-5B5E-4A04-93D3-5772E3CE3818}" type="datetime1">
               <a:rPr lang="en-US" smtClean="0"/>
-              <a:t>04/24/21</a:t>
+              <a:t>04/29/21</a:t>
             </a:fld>
             <a:endParaRPr lang="en-US" dirty="0"/>
           </a:p>
@@ -2793,7 +2793,7 @@
           <a:p>
             <a:fld id="{4EDE50D6-574B-40AF-946F-D52A04ADE379}" type="datetime1">
               <a:rPr lang="en-US" smtClean="0"/>
-              <a:t>04/24/21</a:t>
+              <a:t>04/29/21</a:t>
             </a:fld>
             <a:endParaRPr lang="en-US" dirty="0"/>
           </a:p>
@@ -3170,7 +3170,7 @@
           <a:p>
             <a:fld id="{D82884F1-FFEA-405F-9602-3DCA865EDA4E}" type="datetime1">
               <a:rPr lang="en-US" smtClean="0"/>
-              <a:t>04/24/21</a:t>
+              <a:t>04/29/21</a:t>
             </a:fld>
             <a:endParaRPr lang="en-US" dirty="0"/>
           </a:p>
@@ -3463,7 +3463,7 @@
           <a:p>
             <a:fld id="{7E18DB4A-8810-4A10-AD5C-D5E2C667F5B3}" type="datetime1">
               <a:rPr lang="en-US" smtClean="0"/>
-              <a:t>04/24/21</a:t>
+              <a:t>04/29/21</a:t>
             </a:fld>
             <a:endParaRPr lang="en-US" dirty="0"/>
           </a:p>
@@ -3678,7 +3678,7 @@
           <a:p>
             <a:fld id="{ED291B17-9318-49DB-B28B-6E5994AE9581}" type="datetime1">
               <a:rPr lang="en-US" smtClean="0"/>
-              <a:t>04/24/21</a:t>
+              <a:t>04/29/21</a:t>
             </a:fld>
             <a:endParaRPr lang="en-US" dirty="0"/>
           </a:p>
@@ -6634,6 +6634,294 @@
           </a:p>
         </p:txBody>
       </p:sp>
+      <p:sp>
+        <p:nvSpPr>
+          <p:cNvPr id="41" name="Subtitle 2">
+            <a:extLst>
+              <a:ext uri="{FF2B5EF4-FFF2-40B4-BE49-F238E27FC236}">
+                <a16:creationId xmlns:a16="http://schemas.microsoft.com/office/drawing/2014/main" id="{076B2AA6-2898-4252-A655-965F07BA8D0B}"/>
+              </a:ext>
+            </a:extLst>
+          </p:cNvPr>
+          <p:cNvSpPr txBox="1">
+            <a:spLocks/>
+          </p:cNvSpPr>
+          <p:nvPr/>
+        </p:nvSpPr>
+        <p:spPr>
+          <a:xfrm>
+            <a:off x="386962" y="4803796"/>
+            <a:ext cx="4030704" cy="1219374"/>
+          </a:xfrm>
+          <a:prstGeom prst="rect">
+            <a:avLst/>
+          </a:prstGeom>
+        </p:spPr>
+        <p:txBody>
+          <a:bodyPr vert="horz" lIns="91440" tIns="45720" rIns="91440" bIns="45720" rtlCol="0" anchor="t">
+            <a:normAutofit fontScale="47500" lnSpcReduction="20000"/>
+          </a:bodyPr>
+          <a:lstStyle>
+            <a:lvl1pPr marL="0" indent="0" algn="l" defTabSz="457200" rtl="0" eaLnBrk="1" latinLnBrk="0" hangingPunct="1">
+              <a:lnSpc>
+                <a:spcPct val="110000"/>
+              </a:lnSpc>
+              <a:spcBef>
+                <a:spcPct val="20000"/>
+              </a:spcBef>
+              <a:spcAft>
+                <a:spcPts val="600"/>
+              </a:spcAft>
+              <a:buClr>
+                <a:schemeClr val="accent1"/>
+              </a:buClr>
+              <a:buSzPct val="92000"/>
+              <a:buFont typeface="Wingdings 2" panose="05020102010507070707" pitchFamily="18" charset="2"/>
+              <a:buNone/>
+              <a:defRPr sz="1600" kern="1200" cap="all">
+                <a:solidFill>
+                  <a:schemeClr val="accent1"/>
+                </a:solidFill>
+                <a:latin typeface="+mn-lt"/>
+                <a:ea typeface="+mn-ea"/>
+                <a:cs typeface="+mn-cs"/>
+              </a:defRPr>
+            </a:lvl1pPr>
+            <a:lvl2pPr marL="457200" indent="0" algn="ctr" defTabSz="457200" rtl="0" eaLnBrk="1" latinLnBrk="0" hangingPunct="1">
+              <a:spcBef>
+                <a:spcPct val="20000"/>
+              </a:spcBef>
+              <a:spcAft>
+                <a:spcPts val="600"/>
+              </a:spcAft>
+              <a:buClr>
+                <a:schemeClr val="accent1"/>
+              </a:buClr>
+              <a:buSzPct val="92000"/>
+              <a:buFont typeface="Wingdings 2" panose="05020102010507070707" pitchFamily="18" charset="2"/>
+              <a:buNone/>
+              <a:defRPr sz="1400" kern="1200">
+                <a:solidFill>
+                  <a:schemeClr val="tx1">
+                    <a:tint val="75000"/>
+                  </a:schemeClr>
+                </a:solidFill>
+                <a:latin typeface="+mn-lt"/>
+                <a:ea typeface="+mn-ea"/>
+                <a:cs typeface="+mn-cs"/>
+              </a:defRPr>
+            </a:lvl2pPr>
+            <a:lvl3pPr marL="914400" indent="0" algn="ctr" defTabSz="457200" rtl="0" eaLnBrk="1" latinLnBrk="0" hangingPunct="1">
+              <a:spcBef>
+                <a:spcPct val="20000"/>
+              </a:spcBef>
+              <a:spcAft>
+                <a:spcPts val="600"/>
+              </a:spcAft>
+              <a:buClr>
+                <a:schemeClr val="accent1"/>
+              </a:buClr>
+              <a:buSzPct val="92000"/>
+              <a:buFont typeface="Wingdings 2" panose="05020102010507070707" pitchFamily="18" charset="2"/>
+              <a:buNone/>
+              <a:defRPr sz="1300" kern="1200">
+                <a:solidFill>
+                  <a:schemeClr val="tx1">
+                    <a:tint val="75000"/>
+                  </a:schemeClr>
+                </a:solidFill>
+                <a:latin typeface="+mn-lt"/>
+                <a:ea typeface="+mn-ea"/>
+                <a:cs typeface="+mn-cs"/>
+              </a:defRPr>
+            </a:lvl3pPr>
+            <a:lvl4pPr marL="1371600" indent="0" algn="ctr" defTabSz="457200" rtl="0" eaLnBrk="1" latinLnBrk="0" hangingPunct="1">
+              <a:spcBef>
+                <a:spcPct val="20000"/>
+              </a:spcBef>
+              <a:spcAft>
+                <a:spcPts val="600"/>
+              </a:spcAft>
+              <a:buClr>
+                <a:schemeClr val="accent1"/>
+              </a:buClr>
+              <a:buSzPct val="92000"/>
+              <a:buFont typeface="Wingdings 2" panose="05020102010507070707" pitchFamily="18" charset="2"/>
+              <a:buNone/>
+              <a:defRPr sz="1100" kern="1200">
+                <a:solidFill>
+                  <a:schemeClr val="tx1">
+                    <a:tint val="75000"/>
+                  </a:schemeClr>
+                </a:solidFill>
+                <a:latin typeface="+mn-lt"/>
+                <a:ea typeface="+mn-ea"/>
+                <a:cs typeface="+mn-cs"/>
+              </a:defRPr>
+            </a:lvl4pPr>
+            <a:lvl5pPr marL="1828800" indent="0" algn="ctr" defTabSz="457200" rtl="0" eaLnBrk="1" latinLnBrk="0" hangingPunct="1">
+              <a:spcBef>
+                <a:spcPct val="20000"/>
+              </a:spcBef>
+              <a:spcAft>
+                <a:spcPts val="600"/>
+              </a:spcAft>
+              <a:buClr>
+                <a:schemeClr val="accent1"/>
+              </a:buClr>
+              <a:buSzPct val="92000"/>
+              <a:buFont typeface="Wingdings 2" panose="05020102010507070707" pitchFamily="18" charset="2"/>
+              <a:buNone/>
+              <a:defRPr sz="1100" kern="1200">
+                <a:solidFill>
+                  <a:schemeClr val="tx1">
+                    <a:tint val="75000"/>
+                  </a:schemeClr>
+                </a:solidFill>
+                <a:latin typeface="+mn-lt"/>
+                <a:ea typeface="+mn-ea"/>
+                <a:cs typeface="+mn-cs"/>
+              </a:defRPr>
+            </a:lvl5pPr>
+            <a:lvl6pPr marL="2286000" indent="0" algn="ctr" defTabSz="457200" rtl="0" eaLnBrk="1" latinLnBrk="0" hangingPunct="1">
+              <a:spcBef>
+                <a:spcPct val="20000"/>
+              </a:spcBef>
+              <a:spcAft>
+                <a:spcPts val="600"/>
+              </a:spcAft>
+              <a:buClr>
+                <a:schemeClr val="accent2"/>
+              </a:buClr>
+              <a:buSzPct val="92000"/>
+              <a:buFont typeface="Wingdings 2" panose="05020102010507070707" pitchFamily="18" charset="2"/>
+              <a:buNone/>
+              <a:defRPr sz="1200" kern="1200">
+                <a:solidFill>
+                  <a:schemeClr val="tx1">
+                    <a:tint val="75000"/>
+                  </a:schemeClr>
+                </a:solidFill>
+                <a:latin typeface="+mn-lt"/>
+                <a:ea typeface="+mn-ea"/>
+                <a:cs typeface="+mn-cs"/>
+              </a:defRPr>
+            </a:lvl6pPr>
+            <a:lvl7pPr marL="2743200" indent="0" algn="ctr" defTabSz="457200" rtl="0" eaLnBrk="1" latinLnBrk="0" hangingPunct="1">
+              <a:spcBef>
+                <a:spcPct val="20000"/>
+              </a:spcBef>
+              <a:spcAft>
+                <a:spcPts val="600"/>
+              </a:spcAft>
+              <a:buClr>
+                <a:schemeClr val="accent2"/>
+              </a:buClr>
+              <a:buSzPct val="92000"/>
+              <a:buFont typeface="Wingdings 2" panose="05020102010507070707" pitchFamily="18" charset="2"/>
+              <a:buNone/>
+              <a:defRPr sz="1200" kern="1200">
+                <a:solidFill>
+                  <a:schemeClr val="tx1">
+                    <a:tint val="75000"/>
+                  </a:schemeClr>
+                </a:solidFill>
+                <a:latin typeface="+mn-lt"/>
+                <a:ea typeface="+mn-ea"/>
+                <a:cs typeface="+mn-cs"/>
+              </a:defRPr>
+            </a:lvl7pPr>
+            <a:lvl8pPr marL="3200400" indent="0" algn="ctr" defTabSz="457200" rtl="0" eaLnBrk="1" latinLnBrk="0" hangingPunct="1">
+              <a:spcBef>
+                <a:spcPct val="20000"/>
+              </a:spcBef>
+              <a:spcAft>
+                <a:spcPts val="600"/>
+              </a:spcAft>
+              <a:buClr>
+                <a:schemeClr val="accent2"/>
+              </a:buClr>
+              <a:buSzPct val="92000"/>
+              <a:buFont typeface="Wingdings 2" panose="05020102010507070707" pitchFamily="18" charset="2"/>
+              <a:buNone/>
+              <a:defRPr sz="1200" kern="1200">
+                <a:solidFill>
+                  <a:schemeClr val="tx1">
+                    <a:tint val="75000"/>
+                  </a:schemeClr>
+                </a:solidFill>
+                <a:latin typeface="+mn-lt"/>
+                <a:ea typeface="+mn-ea"/>
+                <a:cs typeface="+mn-cs"/>
+              </a:defRPr>
+            </a:lvl8pPr>
+            <a:lvl9pPr marL="3657600" indent="0" algn="ctr" defTabSz="457200" rtl="0" eaLnBrk="1" latinLnBrk="0" hangingPunct="1">
+              <a:spcBef>
+                <a:spcPct val="20000"/>
+              </a:spcBef>
+              <a:spcAft>
+                <a:spcPts val="600"/>
+              </a:spcAft>
+              <a:buClr>
+                <a:schemeClr val="accent2"/>
+              </a:buClr>
+              <a:buSzPct val="92000"/>
+              <a:buFont typeface="Wingdings 2" panose="05020102010507070707" pitchFamily="18" charset="2"/>
+              <a:buNone/>
+              <a:defRPr sz="1200" kern="1200">
+                <a:solidFill>
+                  <a:schemeClr val="tx1">
+                    <a:tint val="75000"/>
+                  </a:schemeClr>
+                </a:solidFill>
+                <a:latin typeface="+mn-lt"/>
+                <a:ea typeface="+mn-ea"/>
+                <a:cs typeface="+mn-cs"/>
+              </a:defRPr>
+            </a:lvl9pPr>
+          </a:lstStyle>
+          <a:p>
+            <a:r>
+              <a:rPr lang="en-US" sz="2000" dirty="0">
+                <a:latin typeface="OCRB" panose="020B0609020202020204" pitchFamily="49" charset="0"/>
+              </a:rPr>
+              <a:t>Matthew Gabriel</a:t>
+            </a:r>
+          </a:p>
+          <a:p>
+            <a:r>
+              <a:rPr lang="en-US" sz="2000" dirty="0">
+                <a:latin typeface="OCRB" panose="020B0609020202020204" pitchFamily="49" charset="0"/>
+              </a:rPr>
+              <a:t>Brooks Herrin</a:t>
+            </a:r>
+          </a:p>
+          <a:p>
+            <a:r>
+              <a:rPr lang="en-US" sz="2000" dirty="0">
+                <a:latin typeface="OCRB" panose="020B0609020202020204" pitchFamily="49" charset="0"/>
+              </a:rPr>
+              <a:t>George Maddux</a:t>
+            </a:r>
+          </a:p>
+          <a:p>
+            <a:r>
+              <a:rPr lang="en-US" sz="2000" dirty="0">
+                <a:latin typeface="OCRB" panose="020B0609020202020204" pitchFamily="49" charset="0"/>
+              </a:rPr>
+              <a:t>Anthony McEntire</a:t>
+            </a:r>
+          </a:p>
+          <a:p>
+            <a:r>
+              <a:rPr lang="en-US" sz="2000" dirty="0">
+                <a:latin typeface="OCRB" panose="020B0609020202020204" pitchFamily="49" charset="0"/>
+              </a:rPr>
+              <a:t>Eric Ramsay</a:t>
+            </a:r>
+          </a:p>
+        </p:txBody>
+      </p:sp>
     </p:spTree>
     <p:extLst>
       <p:ext uri="{BB962C8B-B14F-4D97-AF65-F5344CB8AC3E}">
@@ -10804,8 +11092,13 @@
                 </a14:m>
                 <a:r>
                   <a:rPr lang="en-US" dirty="0"/>
-                  <a:t> atoms in the entire observable universe.</a:t>
+                  <a:t> atoms in the entire observable </a:t>
                 </a:r>
+                <a:r>
+                  <a:rPr lang="en-US"/>
+                  <a:t>universe.</a:t>
+                </a:r>
+                <a:endParaRPr lang="en-US" dirty="0"/>
               </a:p>
             </p:txBody>
           </p:sp>
@@ -17592,7 +17885,7 @@
                 </a:solidFill>
                 <a:latin typeface="Abadi" panose="020B0604020104020204" pitchFamily="34" charset="0"/>
               </a:rPr>
-              <a:t>Training the net:</a:t>
+              <a:t>Training &amp; results:</a:t>
             </a:r>
           </a:p>
         </p:txBody>
@@ -17612,7 +17905,7 @@
         <p:spPr>
           <a:xfrm>
             <a:off x="1032484" y="1138265"/>
-            <a:ext cx="9993357" cy="369332"/>
+            <a:ext cx="9993357" cy="923330"/>
           </a:xfrm>
           <a:prstGeom prst="rect">
             <a:avLst/>
@@ -17627,8 +17920,14 @@
           <a:p>
             <a:r>
               <a:rPr lang="en-US" dirty="0"/>
-              <a:t>xxx</a:t>
+              <a:t>We trained our net with an 8600-game set played by high level users on the app Go Quest.</a:t>
             </a:r>
+          </a:p>
+          <a:p>
+            <a:endParaRPr lang="en-US" dirty="0"/>
+          </a:p>
+          <a:p>
+            <a:endParaRPr lang="en-US" dirty="0"/>
           </a:p>
         </p:txBody>
       </p:sp>
@@ -17907,8 +18206,8 @@
           <p:nvPr/>
         </p:nvGrpSpPr>
         <p:grpSpPr>
-          <a:xfrm rot="5400000" flipH="1">
-            <a:off x="-1171041" y="1928917"/>
+          <a:xfrm rot="16200000" flipH="1">
+            <a:off x="8022836" y="2611421"/>
             <a:ext cx="5373422" cy="2789294"/>
             <a:chOff x="133815" y="780585"/>
             <a:chExt cx="11883972" cy="5887350"/>
@@ -19656,6 +19955,309 @@
           </p:txBody>
         </p:sp>
       </p:grpSp>
+      <p:sp>
+        <p:nvSpPr>
+          <p:cNvPr id="39" name="Subtitle 2">
+            <a:extLst>
+              <a:ext uri="{FF2B5EF4-FFF2-40B4-BE49-F238E27FC236}">
+                <a16:creationId xmlns:a16="http://schemas.microsoft.com/office/drawing/2014/main" id="{7879A99F-D368-42CD-B319-B3E7E908425E}"/>
+              </a:ext>
+            </a:extLst>
+          </p:cNvPr>
+          <p:cNvSpPr txBox="1">
+            <a:spLocks/>
+          </p:cNvSpPr>
+          <p:nvPr/>
+        </p:nvSpPr>
+        <p:spPr>
+          <a:xfrm>
+            <a:off x="975765" y="611048"/>
+            <a:ext cx="9581128" cy="543088"/>
+          </a:xfrm>
+          <a:prstGeom prst="rect">
+            <a:avLst/>
+          </a:prstGeom>
+        </p:spPr>
+        <p:txBody>
+          <a:bodyPr vert="horz" lIns="91440" tIns="45720" rIns="91440" bIns="45720" rtlCol="0" anchor="t">
+            <a:normAutofit/>
+          </a:bodyPr>
+          <a:lstStyle>
+            <a:lvl1pPr marL="0" indent="0" algn="l" defTabSz="457200" rtl="0" eaLnBrk="1" latinLnBrk="0" hangingPunct="1">
+              <a:lnSpc>
+                <a:spcPct val="110000"/>
+              </a:lnSpc>
+              <a:spcBef>
+                <a:spcPct val="20000"/>
+              </a:spcBef>
+              <a:spcAft>
+                <a:spcPts val="600"/>
+              </a:spcAft>
+              <a:buClr>
+                <a:schemeClr val="accent1"/>
+              </a:buClr>
+              <a:buSzPct val="92000"/>
+              <a:buFont typeface="Wingdings 2" panose="05020102010507070707" pitchFamily="18" charset="2"/>
+              <a:buNone/>
+              <a:defRPr sz="1600" kern="1200" cap="all">
+                <a:solidFill>
+                  <a:schemeClr val="accent1"/>
+                </a:solidFill>
+                <a:latin typeface="+mn-lt"/>
+                <a:ea typeface="+mn-ea"/>
+                <a:cs typeface="+mn-cs"/>
+              </a:defRPr>
+            </a:lvl1pPr>
+            <a:lvl2pPr marL="457200" indent="0" algn="ctr" defTabSz="457200" rtl="0" eaLnBrk="1" latinLnBrk="0" hangingPunct="1">
+              <a:spcBef>
+                <a:spcPct val="20000"/>
+              </a:spcBef>
+              <a:spcAft>
+                <a:spcPts val="600"/>
+              </a:spcAft>
+              <a:buClr>
+                <a:schemeClr val="accent1"/>
+              </a:buClr>
+              <a:buSzPct val="92000"/>
+              <a:buFont typeface="Wingdings 2" panose="05020102010507070707" pitchFamily="18" charset="2"/>
+              <a:buNone/>
+              <a:defRPr sz="1400" kern="1200">
+                <a:solidFill>
+                  <a:schemeClr val="tx1">
+                    <a:tint val="75000"/>
+                  </a:schemeClr>
+                </a:solidFill>
+                <a:latin typeface="+mn-lt"/>
+                <a:ea typeface="+mn-ea"/>
+                <a:cs typeface="+mn-cs"/>
+              </a:defRPr>
+            </a:lvl2pPr>
+            <a:lvl3pPr marL="914400" indent="0" algn="ctr" defTabSz="457200" rtl="0" eaLnBrk="1" latinLnBrk="0" hangingPunct="1">
+              <a:spcBef>
+                <a:spcPct val="20000"/>
+              </a:spcBef>
+              <a:spcAft>
+                <a:spcPts val="600"/>
+              </a:spcAft>
+              <a:buClr>
+                <a:schemeClr val="accent1"/>
+              </a:buClr>
+              <a:buSzPct val="92000"/>
+              <a:buFont typeface="Wingdings 2" panose="05020102010507070707" pitchFamily="18" charset="2"/>
+              <a:buNone/>
+              <a:defRPr sz="1300" kern="1200">
+                <a:solidFill>
+                  <a:schemeClr val="tx1">
+                    <a:tint val="75000"/>
+                  </a:schemeClr>
+                </a:solidFill>
+                <a:latin typeface="+mn-lt"/>
+                <a:ea typeface="+mn-ea"/>
+                <a:cs typeface="+mn-cs"/>
+              </a:defRPr>
+            </a:lvl3pPr>
+            <a:lvl4pPr marL="1371600" indent="0" algn="ctr" defTabSz="457200" rtl="0" eaLnBrk="1" latinLnBrk="0" hangingPunct="1">
+              <a:spcBef>
+                <a:spcPct val="20000"/>
+              </a:spcBef>
+              <a:spcAft>
+                <a:spcPts val="600"/>
+              </a:spcAft>
+              <a:buClr>
+                <a:schemeClr val="accent1"/>
+              </a:buClr>
+              <a:buSzPct val="92000"/>
+              <a:buFont typeface="Wingdings 2" panose="05020102010507070707" pitchFamily="18" charset="2"/>
+              <a:buNone/>
+              <a:defRPr sz="1100" kern="1200">
+                <a:solidFill>
+                  <a:schemeClr val="tx1">
+                    <a:tint val="75000"/>
+                  </a:schemeClr>
+                </a:solidFill>
+                <a:latin typeface="+mn-lt"/>
+                <a:ea typeface="+mn-ea"/>
+                <a:cs typeface="+mn-cs"/>
+              </a:defRPr>
+            </a:lvl4pPr>
+            <a:lvl5pPr marL="1828800" indent="0" algn="ctr" defTabSz="457200" rtl="0" eaLnBrk="1" latinLnBrk="0" hangingPunct="1">
+              <a:spcBef>
+                <a:spcPct val="20000"/>
+              </a:spcBef>
+              <a:spcAft>
+                <a:spcPts val="600"/>
+              </a:spcAft>
+              <a:buClr>
+                <a:schemeClr val="accent1"/>
+              </a:buClr>
+              <a:buSzPct val="92000"/>
+              <a:buFont typeface="Wingdings 2" panose="05020102010507070707" pitchFamily="18" charset="2"/>
+              <a:buNone/>
+              <a:defRPr sz="1100" kern="1200">
+                <a:solidFill>
+                  <a:schemeClr val="tx1">
+                    <a:tint val="75000"/>
+                  </a:schemeClr>
+                </a:solidFill>
+                <a:latin typeface="+mn-lt"/>
+                <a:ea typeface="+mn-ea"/>
+                <a:cs typeface="+mn-cs"/>
+              </a:defRPr>
+            </a:lvl5pPr>
+            <a:lvl6pPr marL="2286000" indent="0" algn="ctr" defTabSz="457200" rtl="0" eaLnBrk="1" latinLnBrk="0" hangingPunct="1">
+              <a:spcBef>
+                <a:spcPct val="20000"/>
+              </a:spcBef>
+              <a:spcAft>
+                <a:spcPts val="600"/>
+              </a:spcAft>
+              <a:buClr>
+                <a:schemeClr val="accent2"/>
+              </a:buClr>
+              <a:buSzPct val="92000"/>
+              <a:buFont typeface="Wingdings 2" panose="05020102010507070707" pitchFamily="18" charset="2"/>
+              <a:buNone/>
+              <a:defRPr sz="1200" kern="1200">
+                <a:solidFill>
+                  <a:schemeClr val="tx1">
+                    <a:tint val="75000"/>
+                  </a:schemeClr>
+                </a:solidFill>
+                <a:latin typeface="+mn-lt"/>
+                <a:ea typeface="+mn-ea"/>
+                <a:cs typeface="+mn-cs"/>
+              </a:defRPr>
+            </a:lvl6pPr>
+            <a:lvl7pPr marL="2743200" indent="0" algn="ctr" defTabSz="457200" rtl="0" eaLnBrk="1" latinLnBrk="0" hangingPunct="1">
+              <a:spcBef>
+                <a:spcPct val="20000"/>
+              </a:spcBef>
+              <a:spcAft>
+                <a:spcPts val="600"/>
+              </a:spcAft>
+              <a:buClr>
+                <a:schemeClr val="accent2"/>
+              </a:buClr>
+              <a:buSzPct val="92000"/>
+              <a:buFont typeface="Wingdings 2" panose="05020102010507070707" pitchFamily="18" charset="2"/>
+              <a:buNone/>
+              <a:defRPr sz="1200" kern="1200">
+                <a:solidFill>
+                  <a:schemeClr val="tx1">
+                    <a:tint val="75000"/>
+                  </a:schemeClr>
+                </a:solidFill>
+                <a:latin typeface="+mn-lt"/>
+                <a:ea typeface="+mn-ea"/>
+                <a:cs typeface="+mn-cs"/>
+              </a:defRPr>
+            </a:lvl7pPr>
+            <a:lvl8pPr marL="3200400" indent="0" algn="ctr" defTabSz="457200" rtl="0" eaLnBrk="1" latinLnBrk="0" hangingPunct="1">
+              <a:spcBef>
+                <a:spcPct val="20000"/>
+              </a:spcBef>
+              <a:spcAft>
+                <a:spcPts val="600"/>
+              </a:spcAft>
+              <a:buClr>
+                <a:schemeClr val="accent2"/>
+              </a:buClr>
+              <a:buSzPct val="92000"/>
+              <a:buFont typeface="Wingdings 2" panose="05020102010507070707" pitchFamily="18" charset="2"/>
+              <a:buNone/>
+              <a:defRPr sz="1200" kern="1200">
+                <a:solidFill>
+                  <a:schemeClr val="tx1">
+                    <a:tint val="75000"/>
+                  </a:schemeClr>
+                </a:solidFill>
+                <a:latin typeface="+mn-lt"/>
+                <a:ea typeface="+mn-ea"/>
+                <a:cs typeface="+mn-cs"/>
+              </a:defRPr>
+            </a:lvl8pPr>
+            <a:lvl9pPr marL="3657600" indent="0" algn="ctr" defTabSz="457200" rtl="0" eaLnBrk="1" latinLnBrk="0" hangingPunct="1">
+              <a:spcBef>
+                <a:spcPct val="20000"/>
+              </a:spcBef>
+              <a:spcAft>
+                <a:spcPts val="600"/>
+              </a:spcAft>
+              <a:buClr>
+                <a:schemeClr val="accent2"/>
+              </a:buClr>
+              <a:buSzPct val="92000"/>
+              <a:buFont typeface="Wingdings 2" panose="05020102010507070707" pitchFamily="18" charset="2"/>
+              <a:buNone/>
+              <a:defRPr sz="1200" kern="1200">
+                <a:solidFill>
+                  <a:schemeClr val="tx1">
+                    <a:tint val="75000"/>
+                  </a:schemeClr>
+                </a:solidFill>
+                <a:latin typeface="+mn-lt"/>
+                <a:ea typeface="+mn-ea"/>
+                <a:cs typeface="+mn-cs"/>
+              </a:defRPr>
+            </a:lvl9pPr>
+          </a:lstStyle>
+          <a:p>
+            <a:r>
+              <a:rPr lang="en-US" sz="2400" dirty="0">
+                <a:solidFill>
+                  <a:schemeClr val="tx1">
+                    <a:lumMod val="75000"/>
+                    <a:lumOff val="25000"/>
+                  </a:schemeClr>
+                </a:solidFill>
+                <a:latin typeface="Abadi" panose="020B0604020104020204" pitchFamily="34" charset="0"/>
+              </a:rPr>
+              <a:t>conclusion:</a:t>
+            </a:r>
+          </a:p>
+        </p:txBody>
+      </p:sp>
+      <p:sp>
+        <p:nvSpPr>
+          <p:cNvPr id="41" name="TextBox 40">
+            <a:extLst>
+              <a:ext uri="{FF2B5EF4-FFF2-40B4-BE49-F238E27FC236}">
+                <a16:creationId xmlns:a16="http://schemas.microsoft.com/office/drawing/2014/main" id="{E08BB26D-573D-4629-9AF4-CC475AB8D969}"/>
+              </a:ext>
+            </a:extLst>
+          </p:cNvPr>
+          <p:cNvSpPr txBox="1"/>
+          <p:nvPr/>
+        </p:nvSpPr>
+        <p:spPr>
+          <a:xfrm>
+            <a:off x="1032484" y="1138265"/>
+            <a:ext cx="9993357" cy="1477328"/>
+          </a:xfrm>
+          <a:prstGeom prst="rect">
+            <a:avLst/>
+          </a:prstGeom>
+          <a:noFill/>
+        </p:spPr>
+        <p:txBody>
+          <a:bodyPr wrap="square" rtlCol="0">
+            <a:spAutoFit/>
+          </a:bodyPr>
+          <a:lstStyle/>
+          <a:p>
+            <a:r>
+              <a:rPr lang="en-US" dirty="0"/>
+              <a:t>In the end, we weren’t able to develop a competent model even though our setup was very similar to others that we researched in the beginning stages. Given more time to research and altar our training, we believe that our model could have become more viable.</a:t>
+            </a:r>
+          </a:p>
+          <a:p>
+            <a:endParaRPr lang="en-US" dirty="0"/>
+          </a:p>
+          <a:p>
+            <a:endParaRPr lang="en-US" dirty="0"/>
+          </a:p>
+        </p:txBody>
+      </p:sp>
     </p:spTree>
     <p:extLst>
       <p:ext uri="{BB962C8B-B14F-4D97-AF65-F5344CB8AC3E}">
@@ -21682,44 +22284,6 @@
       </p:grpSp>
       <p:sp>
         <p:nvSpPr>
-          <p:cNvPr id="66" name="Subtitle 2">
-            <a:extLst>
-              <a:ext uri="{FF2B5EF4-FFF2-40B4-BE49-F238E27FC236}">
-                <a16:creationId xmlns:a16="http://schemas.microsoft.com/office/drawing/2014/main" id="{38BF2FA1-6EAE-4D8C-8826-A5A480F63BB1}"/>
-              </a:ext>
-            </a:extLst>
-          </p:cNvPr>
-          <p:cNvSpPr>
-            <a:spLocks noGrp="1"/>
-          </p:cNvSpPr>
-          <p:nvPr>
-            <p:ph type="subTitle" idx="1"/>
-          </p:nvPr>
-        </p:nvSpPr>
-        <p:spPr>
-          <a:xfrm>
-            <a:off x="6926319" y="1861620"/>
-            <a:ext cx="4030704" cy="1219374"/>
-          </a:xfrm>
-        </p:spPr>
-        <p:txBody>
-          <a:bodyPr>
-            <a:normAutofit/>
-          </a:bodyPr>
-          <a:lstStyle/>
-          <a:p>
-            <a:pPr algn="ctr"/>
-            <a:r>
-              <a:rPr lang="en-US" sz="2000" dirty="0">
-                <a:latin typeface="OCRB" panose="020B0609020202020204" pitchFamily="49" charset="0"/>
-              </a:rPr>
-              <a:t>Played by a neural net</a:t>
-            </a:r>
-          </a:p>
-        </p:txBody>
-      </p:sp>
-      <p:sp>
-        <p:nvSpPr>
           <p:cNvPr id="67" name="Subtitle 2">
             <a:extLst>
               <a:ext uri="{FF2B5EF4-FFF2-40B4-BE49-F238E27FC236}">
@@ -21734,7 +22298,7 @@
         </p:nvSpPr>
         <p:spPr>
           <a:xfrm>
-            <a:off x="7625759" y="1439214"/>
+            <a:off x="6986347" y="1495722"/>
             <a:ext cx="4030703" cy="1157875"/>
           </a:xfrm>
           <a:prstGeom prst="rect">
@@ -21965,7 +22529,7 @@
             </a:lvl9pPr>
           </a:lstStyle>
           <a:p>
-            <a:pPr algn="ctr"/>
+            <a:pPr algn="r"/>
             <a:r>
               <a:rPr lang="en-US" sz="2800" dirty="0">
                 <a:solidFill>
@@ -21987,6 +22551,31 @@
               </a:solidFill>
               <a:latin typeface="OCRB" panose="020B0609020202020204" pitchFamily="49" charset="0"/>
             </a:endParaRPr>
+          </a:p>
+        </p:txBody>
+      </p:sp>
+      <p:sp>
+        <p:nvSpPr>
+          <p:cNvPr id="3" name="Subtitle 2">
+            <a:extLst>
+              <a:ext uri="{FF2B5EF4-FFF2-40B4-BE49-F238E27FC236}">
+                <a16:creationId xmlns:a16="http://schemas.microsoft.com/office/drawing/2014/main" id="{8DE3EF16-9C06-4482-A336-9196512384DB}"/>
+              </a:ext>
+            </a:extLst>
+          </p:cNvPr>
+          <p:cNvSpPr>
+            <a:spLocks noGrp="1"/>
+          </p:cNvSpPr>
+          <p:nvPr>
+            <p:ph type="subTitle" idx="1"/>
+          </p:nvPr>
+        </p:nvSpPr>
+        <p:spPr/>
+        <p:txBody>
+          <a:bodyPr/>
+          <a:lstStyle/>
+          <a:p>
+            <a:endParaRPr lang="en-US"/>
           </a:p>
         </p:txBody>
       </p:sp>
@@ -22273,6 +22862,24 @@
 </file>
 
 <file path=customXml/item1.xml><?xml version="1.0" encoding="utf-8"?>
+<p:properties xmlns:p="http://schemas.microsoft.com/office/2006/metadata/properties" xmlns:xsi="http://www.w3.org/2001/XMLSchema-instance" xmlns:pc="http://schemas.microsoft.com/office/infopath/2007/PartnerControls">
+  <documentManagement>
+    <Status xmlns="71af3243-3dd4-4a8d-8c0d-dd76da1f02a5">Not started</Status>
+    <MediaServiceKeyPoints xmlns="71af3243-3dd4-4a8d-8c0d-dd76da1f02a5" xsi:nil="true"/>
+  </documentManagement>
+</p:properties>
+</file>
+
+<file path=customXml/item2.xml><?xml version="1.0" encoding="utf-8"?>
+<?mso-contentType ?>
+<FormTemplates xmlns="http://schemas.microsoft.com/sharepoint/v3/contenttype/forms">
+  <Display>DocumentLibraryForm</Display>
+  <Edit>DocumentLibraryForm</Edit>
+  <New>DocumentLibraryForm</New>
+</FormTemplates>
+</file>
+
+<file path=customXml/item3.xml><?xml version="1.0" encoding="utf-8"?>
 <ct:contentTypeSchema xmlns:ct="http://schemas.microsoft.com/office/2006/metadata/contentType" xmlns:ma="http://schemas.microsoft.com/office/2006/metadata/properties/metaAttributes" ct:_="" ma:_="" ma:contentTypeName="Document" ma:contentTypeID="0x01010079F111ED35F8CC479449609E8A0923A6" ma:contentTypeVersion="12" ma:contentTypeDescription="Create a new document." ma:contentTypeScope="" ma:versionID="a410dd7f93c95333ffa1b60ed6adedd1">
   <xsd:schema xmlns:xsd="http://www.w3.org/2001/XMLSchema" xmlns:xs="http://www.w3.org/2001/XMLSchema" xmlns:p="http://schemas.microsoft.com/office/2006/metadata/properties" xmlns:ns2="71af3243-3dd4-4a8d-8c0d-dd76da1f02a5" xmlns:ns3="16c05727-aa75-4e4a-9b5f-8a80a1165891" targetNamespace="http://schemas.microsoft.com/office/2006/metadata/properties" ma:root="true" ma:fieldsID="a936d9baba76aa3866493feff160faab" ns2:_="" ns3:_="">
     <xsd:import namespace="71af3243-3dd4-4a8d-8c0d-dd76da1f02a5"/>
@@ -22493,25 +23100,25 @@
 </ct:contentTypeSchema>
 </file>
 
-<file path=customXml/item2.xml><?xml version="1.0" encoding="utf-8"?>
-<?mso-contentType ?>
-<FormTemplates xmlns="http://schemas.microsoft.com/sharepoint/v3/contenttype/forms">
-  <Display>DocumentLibraryForm</Display>
-  <Edit>DocumentLibraryForm</Edit>
-  <New>DocumentLibraryForm</New>
-</FormTemplates>
+<file path=customXml/itemProps1.xml><?xml version="1.0" encoding="utf-8"?>
+<ds:datastoreItem xmlns:ds="http://schemas.openxmlformats.org/officeDocument/2006/customXml" ds:itemID="{8D289AE2-D2AE-49D1-AFAC-3A79F6794255}">
+  <ds:schemaRefs>
+    <ds:schemaRef ds:uri="http://schemas.microsoft.com/office/2006/metadata/properties"/>
+    <ds:schemaRef ds:uri="http://schemas.microsoft.com/office/infopath/2007/PartnerControls"/>
+    <ds:schemaRef ds:uri="71af3243-3dd4-4a8d-8c0d-dd76da1f02a5"/>
+  </ds:schemaRefs>
+</ds:datastoreItem>
 </file>
 
-<file path=customXml/item3.xml><?xml version="1.0" encoding="utf-8"?>
-<p:properties xmlns:p="http://schemas.microsoft.com/office/2006/metadata/properties" xmlns:xsi="http://www.w3.org/2001/XMLSchema-instance" xmlns:pc="http://schemas.microsoft.com/office/infopath/2007/PartnerControls">
-  <documentManagement>
-    <Status xmlns="71af3243-3dd4-4a8d-8c0d-dd76da1f02a5">Not started</Status>
-    <MediaServiceKeyPoints xmlns="71af3243-3dd4-4a8d-8c0d-dd76da1f02a5" xsi:nil="true"/>
-  </documentManagement>
-</p:properties>
+<file path=customXml/itemProps2.xml><?xml version="1.0" encoding="utf-8"?>
+<ds:datastoreItem xmlns:ds="http://schemas.openxmlformats.org/officeDocument/2006/customXml" ds:itemID="{927BD4C1-B6B1-4715-ABF9-E660A51A4EA0}">
+  <ds:schemaRefs>
+    <ds:schemaRef ds:uri="http://schemas.microsoft.com/sharepoint/v3/contenttype/forms"/>
+  </ds:schemaRefs>
+</ds:datastoreItem>
 </file>
 
-<file path=customXml/itemProps1.xml><?xml version="1.0" encoding="utf-8"?>
+<file path=customXml/itemProps3.xml><?xml version="1.0" encoding="utf-8"?>
 <ds:datastoreItem xmlns:ds="http://schemas.openxmlformats.org/officeDocument/2006/customXml" ds:itemID="{41E7CA09-9778-4414-AE97-8064B12DA30E}">
   <ds:schemaRefs>
     <ds:schemaRef ds:uri="http://schemas.microsoft.com/office/2006/metadata/contentType"/>
@@ -22528,22 +23135,4 @@
     <ds:schemaRef ds:uri="http://schemas.microsoft.com/internal/obd"/>
   </ds:schemaRefs>
 </ds:datastoreItem>
-</file>
-
-<file path=customXml/itemProps2.xml><?xml version="1.0" encoding="utf-8"?>
-<ds:datastoreItem xmlns:ds="http://schemas.openxmlformats.org/officeDocument/2006/customXml" ds:itemID="{927BD4C1-B6B1-4715-ABF9-E660A51A4EA0}">
-  <ds:schemaRefs>
-    <ds:schemaRef ds:uri="http://schemas.microsoft.com/sharepoint/v3/contenttype/forms"/>
-  </ds:schemaRefs>
-</ds:datastoreItem>
-</file>
-
-<file path=customXml/itemProps3.xml><?xml version="1.0" encoding="utf-8"?>
-<ds:datastoreItem xmlns:ds="http://schemas.openxmlformats.org/officeDocument/2006/customXml" ds:itemID="{8D289AE2-D2AE-49D1-AFAC-3A79F6794255}">
-  <ds:schemaRefs>
-    <ds:schemaRef ds:uri="http://schemas.microsoft.com/office/2006/metadata/properties"/>
-    <ds:schemaRef ds:uri="http://schemas.microsoft.com/office/infopath/2007/PartnerControls"/>
-    <ds:schemaRef ds:uri="71af3243-3dd4-4a8d-8c0d-dd76da1f02a5"/>
-  </ds:schemaRefs>
-</ds:datastoreItem>
 </file>
</xml_diff>